<commit_message>
modified in er and added other entity
</commit_message>
<xml_diff>
--- a/ER.pptx
+++ b/ER.pptx
@@ -289,7 +289,7 @@
             <a:fld id="{1D8BD707-D9CF-40AE-B4C6-C98DA3205C09}" type="datetimeFigureOut">
               <a:rPr lang="en-US" smtClean="0"/>
               <a:pPr/>
-              <a:t>8/29/2023</a:t>
+              <a:t>8/30/2023</a:t>
             </a:fld>
             <a:endParaRPr lang="en-US"/>
           </a:p>
@@ -456,7 +456,7 @@
             <a:fld id="{1D8BD707-D9CF-40AE-B4C6-C98DA3205C09}" type="datetimeFigureOut">
               <a:rPr lang="en-US" smtClean="0"/>
               <a:pPr/>
-              <a:t>8/29/2023</a:t>
+              <a:t>8/30/2023</a:t>
             </a:fld>
             <a:endParaRPr lang="en-US"/>
           </a:p>
@@ -633,7 +633,7 @@
             <a:fld id="{1D8BD707-D9CF-40AE-B4C6-C98DA3205C09}" type="datetimeFigureOut">
               <a:rPr lang="en-US" smtClean="0"/>
               <a:pPr/>
-              <a:t>8/29/2023</a:t>
+              <a:t>8/30/2023</a:t>
             </a:fld>
             <a:endParaRPr lang="en-US"/>
           </a:p>
@@ -800,7 +800,7 @@
             <a:fld id="{1D8BD707-D9CF-40AE-B4C6-C98DA3205C09}" type="datetimeFigureOut">
               <a:rPr lang="en-US" smtClean="0"/>
               <a:pPr/>
-              <a:t>8/29/2023</a:t>
+              <a:t>8/30/2023</a:t>
             </a:fld>
             <a:endParaRPr lang="en-US"/>
           </a:p>
@@ -1043,7 +1043,7 @@
             <a:fld id="{1D8BD707-D9CF-40AE-B4C6-C98DA3205C09}" type="datetimeFigureOut">
               <a:rPr lang="en-US" smtClean="0"/>
               <a:pPr/>
-              <a:t>8/29/2023</a:t>
+              <a:t>8/30/2023</a:t>
             </a:fld>
             <a:endParaRPr lang="en-US"/>
           </a:p>
@@ -1328,7 +1328,7 @@
             <a:fld id="{1D8BD707-D9CF-40AE-B4C6-C98DA3205C09}" type="datetimeFigureOut">
               <a:rPr lang="en-US" smtClean="0"/>
               <a:pPr/>
-              <a:t>8/29/2023</a:t>
+              <a:t>8/30/2023</a:t>
             </a:fld>
             <a:endParaRPr lang="en-US"/>
           </a:p>
@@ -1747,7 +1747,7 @@
             <a:fld id="{1D8BD707-D9CF-40AE-B4C6-C98DA3205C09}" type="datetimeFigureOut">
               <a:rPr lang="en-US" smtClean="0"/>
               <a:pPr/>
-              <a:t>8/29/2023</a:t>
+              <a:t>8/30/2023</a:t>
             </a:fld>
             <a:endParaRPr lang="en-US"/>
           </a:p>
@@ -1862,7 +1862,7 @@
             <a:fld id="{1D8BD707-D9CF-40AE-B4C6-C98DA3205C09}" type="datetimeFigureOut">
               <a:rPr lang="en-US" smtClean="0"/>
               <a:pPr/>
-              <a:t>8/29/2023</a:t>
+              <a:t>8/30/2023</a:t>
             </a:fld>
             <a:endParaRPr lang="en-US"/>
           </a:p>
@@ -1954,7 +1954,7 @@
             <a:fld id="{1D8BD707-D9CF-40AE-B4C6-C98DA3205C09}" type="datetimeFigureOut">
               <a:rPr lang="en-US" smtClean="0"/>
               <a:pPr/>
-              <a:t>8/29/2023</a:t>
+              <a:t>8/30/2023</a:t>
             </a:fld>
             <a:endParaRPr lang="en-US"/>
           </a:p>
@@ -2228,7 +2228,7 @@
             <a:fld id="{1D8BD707-D9CF-40AE-B4C6-C98DA3205C09}" type="datetimeFigureOut">
               <a:rPr lang="en-US" smtClean="0"/>
               <a:pPr/>
-              <a:t>8/29/2023</a:t>
+              <a:t>8/30/2023</a:t>
             </a:fld>
             <a:endParaRPr lang="en-US"/>
           </a:p>
@@ -2478,7 +2478,7 @@
             <a:fld id="{1D8BD707-D9CF-40AE-B4C6-C98DA3205C09}" type="datetimeFigureOut">
               <a:rPr lang="en-US" smtClean="0"/>
               <a:pPr/>
-              <a:t>8/29/2023</a:t>
+              <a:t>8/30/2023</a:t>
             </a:fld>
             <a:endParaRPr lang="en-US"/>
           </a:p>
@@ -2688,7 +2688,7 @@
             <a:fld id="{1D8BD707-D9CF-40AE-B4C6-C98DA3205C09}" type="datetimeFigureOut">
               <a:rPr lang="en-US" smtClean="0"/>
               <a:pPr/>
-              <a:t>8/29/2023</a:t>
+              <a:t>8/30/2023</a:t>
             </a:fld>
             <a:endParaRPr lang="en-US"/>
           </a:p>
@@ -4878,7 +4878,7 @@
         </p:nvSpPr>
         <p:spPr>
           <a:xfrm>
-            <a:off x="10107504" y="2088322"/>
+            <a:off x="9410699" y="2894830"/>
             <a:ext cx="572691" cy="430887"/>
           </a:xfrm>
           <a:prstGeom prst="rect">
@@ -4938,7 +4938,7 @@
         <p:spPr>
           <a:xfrm flipV="1">
             <a:off x="10121052" y="2017588"/>
-            <a:ext cx="1703495" cy="573213"/>
+            <a:ext cx="1753581" cy="573214"/>
           </a:xfrm>
           <a:prstGeom prst="line">
             <a:avLst/>
@@ -5520,8 +5520,8 @@
         </p:nvCxnSpPr>
         <p:spPr>
           <a:xfrm flipV="1">
-            <a:off x="6216146" y="5574956"/>
-            <a:ext cx="1988639" cy="1"/>
+            <a:off x="6172200" y="5574959"/>
+            <a:ext cx="2138202" cy="2"/>
           </a:xfrm>
           <a:prstGeom prst="line">
             <a:avLst/>
@@ -5643,8 +5643,8 @@
         </p:nvCxnSpPr>
         <p:spPr>
           <a:xfrm flipV="1">
-            <a:off x="2380835" y="5574956"/>
-            <a:ext cx="1606231" cy="3"/>
+            <a:off x="2380835" y="5574960"/>
+            <a:ext cx="1657765" cy="1"/>
           </a:xfrm>
           <a:prstGeom prst="line">
             <a:avLst/>
@@ -5803,6 +5803,482 @@
           <a:xfrm flipH="1">
             <a:off x="1714500" y="1005927"/>
             <a:ext cx="425014" cy="972593"/>
+          </a:xfrm>
+          <a:prstGeom prst="line">
+            <a:avLst/>
+          </a:prstGeom>
+        </p:spPr>
+        <p:style>
+          <a:lnRef idx="1">
+            <a:schemeClr val="accent1"/>
+          </a:lnRef>
+          <a:fillRef idx="0">
+            <a:schemeClr val="accent1"/>
+          </a:fillRef>
+          <a:effectRef idx="0">
+            <a:schemeClr val="accent1"/>
+          </a:effectRef>
+          <a:fontRef idx="minor">
+            <a:schemeClr val="tx1"/>
+          </a:fontRef>
+        </p:style>
+      </p:cxnSp>
+      <p:sp>
+        <p:nvSpPr>
+          <p:cNvPr id="62" name="Rectangle 61"/>
+          <p:cNvSpPr/>
+          <p:nvPr/>
+        </p:nvSpPr>
+        <p:spPr>
+          <a:xfrm>
+            <a:off x="12624647" y="3557932"/>
+            <a:ext cx="2133600" cy="762000"/>
+          </a:xfrm>
+          <a:prstGeom prst="rect">
+            <a:avLst/>
+          </a:prstGeom>
+          <a:solidFill>
+            <a:schemeClr val="accent1">
+              <a:lumMod val="60000"/>
+              <a:lumOff val="40000"/>
+            </a:schemeClr>
+          </a:solidFill>
+          <a:ln>
+            <a:solidFill>
+              <a:schemeClr val="tx2"/>
+            </a:solidFill>
+          </a:ln>
+        </p:spPr>
+        <p:style>
+          <a:lnRef idx="2">
+            <a:schemeClr val="accent1">
+              <a:shade val="50000"/>
+            </a:schemeClr>
+          </a:lnRef>
+          <a:fillRef idx="1">
+            <a:schemeClr val="accent1"/>
+          </a:fillRef>
+          <a:effectRef idx="0">
+            <a:schemeClr val="accent1"/>
+          </a:effectRef>
+          <a:fontRef idx="minor">
+            <a:schemeClr val="lt1"/>
+          </a:fontRef>
+        </p:style>
+        <p:txBody>
+          <a:bodyPr lIns="110578" tIns="55289" rIns="110578" bIns="55289" spcCol="0" rtlCol="0" anchor="ctr"/>
+          <a:lstStyle/>
+          <a:p>
+            <a:pPr algn="ctr"/>
+            <a:r>
+              <a:rPr lang="en-US" b="1" dirty="0" smtClean="0">
+                <a:solidFill>
+                  <a:schemeClr val="tx1"/>
+                </a:solidFill>
+              </a:rPr>
+              <a:t>Product-Images</a:t>
+            </a:r>
+            <a:endParaRPr lang="en-US" b="1" dirty="0">
+              <a:solidFill>
+                <a:schemeClr val="tx1"/>
+              </a:solidFill>
+            </a:endParaRPr>
+          </a:p>
+        </p:txBody>
+      </p:sp>
+      <p:sp>
+        <p:nvSpPr>
+          <p:cNvPr id="63" name="Diamond 62"/>
+          <p:cNvSpPr/>
+          <p:nvPr/>
+        </p:nvSpPr>
+        <p:spPr>
+          <a:xfrm>
+            <a:off x="10333142" y="3412122"/>
+            <a:ext cx="1627295" cy="1053619"/>
+          </a:xfrm>
+          <a:prstGeom prst="diamond">
+            <a:avLst/>
+          </a:prstGeom>
+          <a:solidFill>
+            <a:schemeClr val="accent5">
+              <a:lumMod val="60000"/>
+              <a:lumOff val="40000"/>
+            </a:schemeClr>
+          </a:solidFill>
+          <a:ln>
+            <a:solidFill>
+              <a:schemeClr val="bg1">
+                <a:lumMod val="65000"/>
+              </a:schemeClr>
+            </a:solidFill>
+          </a:ln>
+        </p:spPr>
+        <p:style>
+          <a:lnRef idx="2">
+            <a:schemeClr val="accent1">
+              <a:shade val="50000"/>
+            </a:schemeClr>
+          </a:lnRef>
+          <a:fillRef idx="1">
+            <a:schemeClr val="accent1"/>
+          </a:fillRef>
+          <a:effectRef idx="0">
+            <a:schemeClr val="accent1"/>
+          </a:effectRef>
+          <a:fontRef idx="minor">
+            <a:schemeClr val="lt1"/>
+          </a:fontRef>
+        </p:style>
+        <p:txBody>
+          <a:bodyPr rtlCol="0" anchor="ctr"/>
+          <a:lstStyle/>
+          <a:p>
+            <a:pPr algn="ctr"/>
+            <a:r>
+              <a:rPr lang="en-US" sz="1600" b="1" dirty="0" smtClean="0">
+                <a:solidFill>
+                  <a:schemeClr val="tx1"/>
+                </a:solidFill>
+              </a:rPr>
+              <a:t>has</a:t>
+            </a:r>
+            <a:endParaRPr lang="en-US" sz="1600" b="1" dirty="0">
+              <a:solidFill>
+                <a:schemeClr val="tx1"/>
+              </a:solidFill>
+            </a:endParaRPr>
+          </a:p>
+        </p:txBody>
+      </p:sp>
+      <p:cxnSp>
+        <p:nvCxnSpPr>
+          <p:cNvPr id="64" name="Straight Connector 63"/>
+          <p:cNvCxnSpPr>
+            <a:stCxn id="63" idx="3"/>
+            <a:endCxn id="62" idx="1"/>
+          </p:cNvCxnSpPr>
+          <p:nvPr/>
+        </p:nvCxnSpPr>
+        <p:spPr>
+          <a:xfrm>
+            <a:off x="11960437" y="3938932"/>
+            <a:ext cx="664210" cy="0"/>
+          </a:xfrm>
+          <a:prstGeom prst="line">
+            <a:avLst/>
+          </a:prstGeom>
+        </p:spPr>
+        <p:style>
+          <a:lnRef idx="1">
+            <a:schemeClr val="accent1"/>
+          </a:lnRef>
+          <a:fillRef idx="0">
+            <a:schemeClr val="accent1"/>
+          </a:fillRef>
+          <a:effectRef idx="0">
+            <a:schemeClr val="accent1"/>
+          </a:effectRef>
+          <a:fontRef idx="minor">
+            <a:schemeClr val="tx1"/>
+          </a:fontRef>
+        </p:style>
+      </p:cxnSp>
+      <p:cxnSp>
+        <p:nvCxnSpPr>
+          <p:cNvPr id="70" name="Straight Connector 69"/>
+          <p:cNvCxnSpPr>
+            <a:stCxn id="63" idx="1"/>
+          </p:cNvCxnSpPr>
+          <p:nvPr/>
+        </p:nvCxnSpPr>
+        <p:spPr>
+          <a:xfrm flipH="1" flipV="1">
+            <a:off x="9119784" y="2911441"/>
+            <a:ext cx="1213358" cy="1027491"/>
+          </a:xfrm>
+          <a:prstGeom prst="line">
+            <a:avLst/>
+          </a:prstGeom>
+        </p:spPr>
+        <p:style>
+          <a:lnRef idx="1">
+            <a:schemeClr val="accent1"/>
+          </a:lnRef>
+          <a:fillRef idx="0">
+            <a:schemeClr val="accent1"/>
+          </a:fillRef>
+          <a:effectRef idx="0">
+            <a:schemeClr val="accent1"/>
+          </a:effectRef>
+          <a:fontRef idx="minor">
+            <a:schemeClr val="tx1"/>
+          </a:fontRef>
+        </p:style>
+      </p:cxnSp>
+      <p:sp>
+        <p:nvSpPr>
+          <p:cNvPr id="74" name="TextBox 73"/>
+          <p:cNvSpPr txBox="1"/>
+          <p:nvPr/>
+        </p:nvSpPr>
+        <p:spPr>
+          <a:xfrm>
+            <a:off x="10067957" y="2147545"/>
+            <a:ext cx="572691" cy="430887"/>
+          </a:xfrm>
+          <a:prstGeom prst="rect">
+            <a:avLst/>
+          </a:prstGeom>
+          <a:noFill/>
+        </p:spPr>
+        <p:txBody>
+          <a:bodyPr wrap="square" rtlCol="0">
+            <a:spAutoFit/>
+          </a:bodyPr>
+          <a:lstStyle/>
+          <a:p>
+            <a:r>
+              <a:rPr lang="en-US" b="1" dirty="0" smtClean="0"/>
+              <a:t>1</a:t>
+            </a:r>
+            <a:endParaRPr lang="en-US" b="1" dirty="0"/>
+          </a:p>
+        </p:txBody>
+      </p:sp>
+      <p:sp>
+        <p:nvSpPr>
+          <p:cNvPr id="76" name="TextBox 75"/>
+          <p:cNvSpPr txBox="1"/>
+          <p:nvPr/>
+        </p:nvSpPr>
+        <p:spPr>
+          <a:xfrm>
+            <a:off x="12254924" y="3641844"/>
+            <a:ext cx="572691" cy="369332"/>
+          </a:xfrm>
+          <a:prstGeom prst="rect">
+            <a:avLst/>
+          </a:prstGeom>
+          <a:noFill/>
+        </p:spPr>
+        <p:txBody>
+          <a:bodyPr wrap="square" rtlCol="0">
+            <a:spAutoFit/>
+          </a:bodyPr>
+          <a:lstStyle/>
+          <a:p>
+            <a:r>
+              <a:rPr lang="en-US" sz="1800" dirty="0" smtClean="0"/>
+              <a:t>M</a:t>
+            </a:r>
+            <a:endParaRPr lang="en-US" dirty="0"/>
+          </a:p>
+        </p:txBody>
+      </p:sp>
+      <p:cxnSp>
+        <p:nvCxnSpPr>
+          <p:cNvPr id="77" name="Straight Connector 76"/>
+          <p:cNvCxnSpPr/>
+          <p:nvPr/>
+        </p:nvCxnSpPr>
+        <p:spPr>
+          <a:xfrm flipV="1">
+            <a:off x="11824547" y="4005070"/>
+            <a:ext cx="800100" cy="6106"/>
+          </a:xfrm>
+          <a:prstGeom prst="line">
+            <a:avLst/>
+          </a:prstGeom>
+        </p:spPr>
+        <p:style>
+          <a:lnRef idx="1">
+            <a:schemeClr val="accent1"/>
+          </a:lnRef>
+          <a:fillRef idx="0">
+            <a:schemeClr val="accent1"/>
+          </a:fillRef>
+          <a:effectRef idx="0">
+            <a:schemeClr val="accent1"/>
+          </a:effectRef>
+          <a:fontRef idx="minor">
+            <a:schemeClr val="tx1"/>
+          </a:fontRef>
+        </p:style>
+      </p:cxnSp>
+      <p:sp>
+        <p:nvSpPr>
+          <p:cNvPr id="79" name="Oval 78"/>
+          <p:cNvSpPr/>
+          <p:nvPr/>
+        </p:nvSpPr>
+        <p:spPr>
+          <a:xfrm>
+            <a:off x="11874633" y="2900209"/>
+            <a:ext cx="835817" cy="381000"/>
+          </a:xfrm>
+          <a:prstGeom prst="ellipse">
+            <a:avLst/>
+          </a:prstGeom>
+          <a:solidFill>
+            <a:schemeClr val="bg2">
+              <a:lumMod val="50000"/>
+            </a:schemeClr>
+          </a:solidFill>
+          <a:ln>
+            <a:solidFill>
+              <a:schemeClr val="bg2">
+                <a:lumMod val="90000"/>
+              </a:schemeClr>
+            </a:solidFill>
+          </a:ln>
+        </p:spPr>
+        <p:style>
+          <a:lnRef idx="2">
+            <a:schemeClr val="accent1">
+              <a:shade val="50000"/>
+            </a:schemeClr>
+          </a:lnRef>
+          <a:fillRef idx="1">
+            <a:schemeClr val="accent1"/>
+          </a:fillRef>
+          <a:effectRef idx="0">
+            <a:schemeClr val="accent1"/>
+          </a:effectRef>
+          <a:fontRef idx="minor">
+            <a:schemeClr val="lt1"/>
+          </a:fontRef>
+        </p:style>
+        <p:txBody>
+          <a:bodyPr rtlCol="0" anchor="ctr"/>
+          <a:lstStyle/>
+          <a:p>
+            <a:pPr algn="ctr"/>
+            <a:r>
+              <a:rPr lang="en-US" sz="2100" b="1" u="sng" dirty="0" smtClean="0">
+                <a:solidFill>
+                  <a:schemeClr val="tx1"/>
+                </a:solidFill>
+              </a:rPr>
+              <a:t>Id</a:t>
+            </a:r>
+            <a:endParaRPr lang="en-US" sz="2100" b="1" u="sng" dirty="0">
+              <a:solidFill>
+                <a:schemeClr val="tx1"/>
+              </a:solidFill>
+            </a:endParaRPr>
+          </a:p>
+        </p:txBody>
+      </p:sp>
+      <p:sp>
+        <p:nvSpPr>
+          <p:cNvPr id="80" name="Oval 79"/>
+          <p:cNvSpPr/>
+          <p:nvPr/>
+        </p:nvSpPr>
+        <p:spPr>
+          <a:xfrm>
+            <a:off x="12827615" y="2821146"/>
+            <a:ext cx="949661" cy="289127"/>
+          </a:xfrm>
+          <a:prstGeom prst="ellipse">
+            <a:avLst/>
+          </a:prstGeom>
+          <a:solidFill>
+            <a:schemeClr val="bg2">
+              <a:lumMod val="50000"/>
+            </a:schemeClr>
+          </a:solidFill>
+          <a:ln>
+            <a:solidFill>
+              <a:schemeClr val="bg2">
+                <a:lumMod val="90000"/>
+              </a:schemeClr>
+            </a:solidFill>
+          </a:ln>
+        </p:spPr>
+        <p:style>
+          <a:lnRef idx="2">
+            <a:schemeClr val="accent1">
+              <a:shade val="50000"/>
+            </a:schemeClr>
+          </a:lnRef>
+          <a:fillRef idx="1">
+            <a:schemeClr val="accent1"/>
+          </a:fillRef>
+          <a:effectRef idx="0">
+            <a:schemeClr val="accent1"/>
+          </a:effectRef>
+          <a:fontRef idx="minor">
+            <a:schemeClr val="lt1"/>
+          </a:fontRef>
+        </p:style>
+        <p:txBody>
+          <a:bodyPr rtlCol="0" anchor="ctr"/>
+          <a:lstStyle/>
+          <a:p>
+            <a:pPr algn="ctr"/>
+            <a:r>
+              <a:rPr lang="en-US" sz="1400" b="1" dirty="0" smtClean="0">
+                <a:solidFill>
+                  <a:schemeClr val="tx1"/>
+                </a:solidFill>
+              </a:rPr>
+              <a:t>image</a:t>
+            </a:r>
+            <a:endParaRPr lang="en-US" sz="1400" b="1" dirty="0">
+              <a:solidFill>
+                <a:schemeClr val="tx1"/>
+              </a:solidFill>
+            </a:endParaRPr>
+          </a:p>
+        </p:txBody>
+      </p:sp>
+      <p:cxnSp>
+        <p:nvCxnSpPr>
+          <p:cNvPr id="37" name="Straight Connector 36"/>
+          <p:cNvCxnSpPr>
+            <a:stCxn id="79" idx="4"/>
+            <a:endCxn id="62" idx="0"/>
+          </p:cNvCxnSpPr>
+          <p:nvPr/>
+        </p:nvCxnSpPr>
+        <p:spPr>
+          <a:xfrm>
+            <a:off x="12292542" y="3281209"/>
+            <a:ext cx="1398905" cy="276723"/>
+          </a:xfrm>
+          <a:prstGeom prst="line">
+            <a:avLst/>
+          </a:prstGeom>
+        </p:spPr>
+        <p:style>
+          <a:lnRef idx="1">
+            <a:schemeClr val="accent1"/>
+          </a:lnRef>
+          <a:fillRef idx="0">
+            <a:schemeClr val="accent1"/>
+          </a:fillRef>
+          <a:effectRef idx="0">
+            <a:schemeClr val="accent1"/>
+          </a:effectRef>
+          <a:fontRef idx="minor">
+            <a:schemeClr val="tx1"/>
+          </a:fontRef>
+        </p:style>
+      </p:cxnSp>
+      <p:cxnSp>
+        <p:nvCxnSpPr>
+          <p:cNvPr id="83" name="Straight Connector 82"/>
+          <p:cNvCxnSpPr>
+            <a:stCxn id="80" idx="4"/>
+          </p:cNvCxnSpPr>
+          <p:nvPr/>
+        </p:nvCxnSpPr>
+        <p:spPr>
+          <a:xfrm>
+            <a:off x="13302446" y="3110273"/>
+            <a:ext cx="270700" cy="447659"/>
           </a:xfrm>
           <a:prstGeom prst="line">
             <a:avLst/>

</xml_diff>